<commit_message>
final with presentation and zapiska
</commit_message>
<xml_diff>
--- a/vecator.pptx
+++ b/vecator.pptx
@@ -255,7 +255,7 @@
           <a:p>
             <a:fld id="{DC9D473D-96C1-4CA5-A5DA-E07E508D8CC3}" type="datetimeFigureOut">
               <a:rPr lang="ru-RU" smtClean="0"/>
-              <a:t>13.01.2022</a:t>
+              <a:t>24.01.2022</a:t>
             </a:fld>
             <a:endParaRPr lang="ru-RU"/>
           </a:p>
@@ -423,7 +423,7 @@
           <a:p>
             <a:fld id="{DC9D473D-96C1-4CA5-A5DA-E07E508D8CC3}" type="datetimeFigureOut">
               <a:rPr lang="ru-RU" smtClean="0"/>
-              <a:t>13.01.2022</a:t>
+              <a:t>24.01.2022</a:t>
             </a:fld>
             <a:endParaRPr lang="ru-RU"/>
           </a:p>
@@ -601,7 +601,7 @@
           <a:p>
             <a:fld id="{DC9D473D-96C1-4CA5-A5DA-E07E508D8CC3}" type="datetimeFigureOut">
               <a:rPr lang="ru-RU" smtClean="0"/>
-              <a:t>13.01.2022</a:t>
+              <a:t>24.01.2022</a:t>
             </a:fld>
             <a:endParaRPr lang="ru-RU"/>
           </a:p>
@@ -769,7 +769,7 @@
           <a:p>
             <a:fld id="{DC9D473D-96C1-4CA5-A5DA-E07E508D8CC3}" type="datetimeFigureOut">
               <a:rPr lang="ru-RU" smtClean="0"/>
-              <a:t>13.01.2022</a:t>
+              <a:t>24.01.2022</a:t>
             </a:fld>
             <a:endParaRPr lang="ru-RU"/>
           </a:p>
@@ -1014,7 +1014,7 @@
           <a:p>
             <a:fld id="{DC9D473D-96C1-4CA5-A5DA-E07E508D8CC3}" type="datetimeFigureOut">
               <a:rPr lang="ru-RU" smtClean="0"/>
-              <a:t>13.01.2022</a:t>
+              <a:t>24.01.2022</a:t>
             </a:fld>
             <a:endParaRPr lang="ru-RU"/>
           </a:p>
@@ -1243,7 +1243,7 @@
           <a:p>
             <a:fld id="{DC9D473D-96C1-4CA5-A5DA-E07E508D8CC3}" type="datetimeFigureOut">
               <a:rPr lang="ru-RU" smtClean="0"/>
-              <a:t>13.01.2022</a:t>
+              <a:t>24.01.2022</a:t>
             </a:fld>
             <a:endParaRPr lang="ru-RU"/>
           </a:p>
@@ -1607,7 +1607,7 @@
           <a:p>
             <a:fld id="{DC9D473D-96C1-4CA5-A5DA-E07E508D8CC3}" type="datetimeFigureOut">
               <a:rPr lang="ru-RU" smtClean="0"/>
-              <a:t>13.01.2022</a:t>
+              <a:t>24.01.2022</a:t>
             </a:fld>
             <a:endParaRPr lang="ru-RU"/>
           </a:p>
@@ -1724,7 +1724,7 @@
           <a:p>
             <a:fld id="{DC9D473D-96C1-4CA5-A5DA-E07E508D8CC3}" type="datetimeFigureOut">
               <a:rPr lang="ru-RU" smtClean="0"/>
-              <a:t>13.01.2022</a:t>
+              <a:t>24.01.2022</a:t>
             </a:fld>
             <a:endParaRPr lang="ru-RU"/>
           </a:p>
@@ -1819,7 +1819,7 @@
           <a:p>
             <a:fld id="{DC9D473D-96C1-4CA5-A5DA-E07E508D8CC3}" type="datetimeFigureOut">
               <a:rPr lang="ru-RU" smtClean="0"/>
-              <a:t>13.01.2022</a:t>
+              <a:t>24.01.2022</a:t>
             </a:fld>
             <a:endParaRPr lang="ru-RU"/>
           </a:p>
@@ -2094,7 +2094,7 @@
           <a:p>
             <a:fld id="{DC9D473D-96C1-4CA5-A5DA-E07E508D8CC3}" type="datetimeFigureOut">
               <a:rPr lang="ru-RU" smtClean="0"/>
-              <a:t>13.01.2022</a:t>
+              <a:t>24.01.2022</a:t>
             </a:fld>
             <a:endParaRPr lang="ru-RU"/>
           </a:p>
@@ -2346,7 +2346,7 @@
           <a:p>
             <a:fld id="{DC9D473D-96C1-4CA5-A5DA-E07E508D8CC3}" type="datetimeFigureOut">
               <a:rPr lang="ru-RU" smtClean="0"/>
-              <a:t>13.01.2022</a:t>
+              <a:t>24.01.2022</a:t>
             </a:fld>
             <a:endParaRPr lang="ru-RU"/>
           </a:p>
@@ -2557,7 +2557,7 @@
           <a:p>
             <a:fld id="{DC9D473D-96C1-4CA5-A5DA-E07E508D8CC3}" type="datetimeFigureOut">
               <a:rPr lang="ru-RU" smtClean="0"/>
-              <a:t>13.01.2022</a:t>
+              <a:t>24.01.2022</a:t>
             </a:fld>
             <a:endParaRPr lang="ru-RU"/>
           </a:p>
@@ -3042,6 +3042,13 @@
   <p:clrMapOvr>
     <a:masterClrMapping/>
   </p:clrMapOvr>
+  <p:timing>
+    <p:tnLst>
+      <p:par>
+        <p:cTn id="1" dur="indefinite" restart="never" nodeType="tmRoot"/>
+      </p:par>
+    </p:tnLst>
+  </p:timing>
 </p:sld>
 </file>
 
@@ -3197,6 +3204,13 @@
   <p:clrMapOvr>
     <a:masterClrMapping/>
   </p:clrMapOvr>
+  <p:timing>
+    <p:tnLst>
+      <p:par>
+        <p:cTn id="1" dur="indefinite" restart="never" nodeType="tmRoot"/>
+      </p:par>
+    </p:tnLst>
+  </p:timing>
 </p:sld>
 </file>
 
@@ -3361,7 +3375,7 @@
               <a:buAutoNum type="arabicParenR"/>
             </a:pPr>
             <a:endParaRPr lang="ru-RU" dirty="0">
-              <a:cs typeface="Calibri" panose="020F0502020204030204"/>
+              <a:cs typeface="Calibri"/>
             </a:endParaRPr>
           </a:p>
         </p:txBody>
@@ -3376,6 +3390,13 @@
   <p:clrMapOvr>
     <a:masterClrMapping/>
   </p:clrMapOvr>
+  <p:timing>
+    <p:tnLst>
+      <p:par>
+        <p:cTn id="1" dur="indefinite" restart="never" nodeType="tmRoot"/>
+      </p:par>
+    </p:tnLst>
+  </p:timing>
 </p:sld>
 </file>
 
@@ -3423,7 +3444,7 @@
           <p:cNvPr id="4" name="Объект 3">
             <a:extLst>
               <a:ext uri="{FF2B5EF4-FFF2-40B4-BE49-F238E27FC236}">
-                <a16:creationId xmlns:a16="http://schemas.microsoft.com/office/drawing/2014/main" id="{28FABDE6-C3D1-4078-9172-3824DBC0DA65}"/>
+                <a16:creationId xmlns:a16="http://schemas.microsoft.com/office/drawing/2014/main" xmlns="" id="{28FABDE6-C3D1-4078-9172-3824DBC0DA65}"/>
               </a:ext>
             </a:extLst>
           </p:cNvPr>
@@ -3460,7 +3481,7 @@
           <p:cNvPr id="3" name="Рисунок 3" descr="Изображение выглядит как кот, белый, домашняя кошка, млекопитающее&#10;&#10;Автоматически созданное описание">
             <a:extLst>
               <a:ext uri="{FF2B5EF4-FFF2-40B4-BE49-F238E27FC236}">
-                <a16:creationId xmlns:a16="http://schemas.microsoft.com/office/drawing/2014/main" id="{9A4C9BF3-74B4-4487-835B-9EC30C22247E}"/>
+                <a16:creationId xmlns:a16="http://schemas.microsoft.com/office/drawing/2014/main" xmlns="" id="{9A4C9BF3-74B4-4487-835B-9EC30C22247E}"/>
               </a:ext>
             </a:extLst>
           </p:cNvPr>
@@ -3495,6 +3516,13 @@
   <p:clrMapOvr>
     <a:masterClrMapping/>
   </p:clrMapOvr>
+  <p:timing>
+    <p:tnLst>
+      <p:par>
+        <p:cTn id="1" dur="indefinite" restart="never" nodeType="tmRoot"/>
+      </p:par>
+    </p:tnLst>
+  </p:timing>
 </p:sld>
 </file>
 
@@ -3543,7 +3571,7 @@
           <p:cNvPr id="4" name="Объект 3">
             <a:extLst>
               <a:ext uri="{FF2B5EF4-FFF2-40B4-BE49-F238E27FC236}">
-                <a16:creationId xmlns:a16="http://schemas.microsoft.com/office/drawing/2014/main" id="{2BD92F7F-3070-4337-8FFC-B6F91AFEDB49}"/>
+                <a16:creationId xmlns:a16="http://schemas.microsoft.com/office/drawing/2014/main" xmlns="" id="{2BD92F7F-3070-4337-8FFC-B6F91AFEDB49}"/>
               </a:ext>
             </a:extLst>
           </p:cNvPr>
@@ -3577,13 +3605,7 @@
       </p:sp>
       <p:pic>
         <p:nvPicPr>
-          <p:cNvPr id="3" name="Рисунок 3" descr="Изображение выглядит как текст&#10;&#10;Автоматически созданное описание">
-            <a:extLst>
-              <a:ext uri="{FF2B5EF4-FFF2-40B4-BE49-F238E27FC236}">
-                <a16:creationId xmlns:a16="http://schemas.microsoft.com/office/drawing/2014/main" id="{C644C400-8F03-4593-91C9-B0AB9D4D4491}"/>
-              </a:ext>
-            </a:extLst>
-          </p:cNvPr>
+          <p:cNvPr id="5" name="Рисунок 4"/>
           <p:cNvPicPr>
             <a:picLocks noChangeAspect="1"/>
           </p:cNvPicPr>
@@ -3597,8 +3619,8 @@
         </p:blipFill>
         <p:spPr>
           <a:xfrm>
-            <a:off x="4713959" y="687342"/>
-            <a:ext cx="7263008" cy="5493755"/>
+            <a:off x="4667196" y="635725"/>
+            <a:ext cx="7134978" cy="5516880"/>
           </a:xfrm>
           <a:prstGeom prst="rect">
             <a:avLst/>
@@ -3615,6 +3637,13 @@
   <p:clrMapOvr>
     <a:masterClrMapping/>
   </p:clrMapOvr>
+  <p:timing>
+    <p:tnLst>
+      <p:par>
+        <p:cTn id="1" dur="indefinite" restart="never" nodeType="tmRoot"/>
+      </p:par>
+    </p:tnLst>
+  </p:timing>
 </p:sld>
 </file>
 
@@ -3697,11 +3726,23 @@
               <a:rPr lang="ru-RU" sz="3200" dirty="0"/>
               <a:t>всё до мелочей.</a:t>
             </a:r>
+            <a:r>
+              <a:rPr lang="ru-RU" sz="3200" dirty="0">
+                <a:cs typeface="Calibri"/>
+              </a:rPr>
+              <a:t/>
+            </a:r>
             <a:br>
               <a:rPr lang="ru-RU" sz="3200" dirty="0">
                 <a:cs typeface="Calibri"/>
               </a:rPr>
             </a:br>
+            <a:r>
+              <a:rPr lang="ru-RU" sz="3200" dirty="0">
+                <a:cs typeface="Calibri"/>
+              </a:rPr>
+              <a:t/>
+            </a:r>
             <a:br>
               <a:rPr lang="ru-RU" sz="3200" dirty="0">
                 <a:cs typeface="Calibri"/>
@@ -3737,6 +3778,13 @@
   <p:clrMapOvr>
     <a:masterClrMapping/>
   </p:clrMapOvr>
+  <p:timing>
+    <p:tnLst>
+      <p:par>
+        <p:cTn id="1" dur="indefinite" restart="never" nodeType="tmRoot"/>
+      </p:par>
+    </p:tnLst>
+  </p:timing>
 </p:sld>
 </file>
 
@@ -3830,6 +3878,13 @@
   <p:clrMapOvr>
     <a:masterClrMapping/>
   </p:clrMapOvr>
+  <p:timing>
+    <p:tnLst>
+      <p:par>
+        <p:cTn id="1" dur="indefinite" restart="never" nodeType="tmRoot"/>
+      </p:par>
+    </p:tnLst>
+  </p:timing>
 </p:sld>
 </file>
 

</xml_diff>